<commit_message>
Add PPT templates for case study generation
</commit_message>
<xml_diff>
--- a/templates/BIP_MCG_Case Study_Insert Case Study Name.pptx
+++ b/templates/BIP_MCG_Case Study_Insert Case Study Name.pptx
@@ -197,7 +197,7 @@
           <a:p>
             <a:fld id="{D5AABB63-CFB2-4D40-AEA2-5754A5EE6D14}" type="datetimeFigureOut">
               <a:rPr lang="en-US" smtClean="0"/>
-              <a:t>9/16/25</a:t>
+              <a:t>9/17/25</a:t>
             </a:fld>
             <a:endParaRPr lang="en-US"/>
           </a:p>
@@ -993,7 +993,7 @@
           <a:p>
             <a:fld id="{367B2277-2DAA-45CC-87FF-D5D68B9BD360}" type="datetimeFigureOut">
               <a:rPr lang="en-US" smtClean="0"/>
-              <a:t>9/16/25</a:t>
+              <a:t>9/17/25</a:t>
             </a:fld>
             <a:endParaRPr lang="en-US"/>
           </a:p>
@@ -1191,7 +1191,7 @@
           <a:p>
             <a:fld id="{367B2277-2DAA-45CC-87FF-D5D68B9BD360}" type="datetimeFigureOut">
               <a:rPr lang="en-US" smtClean="0"/>
-              <a:t>9/16/25</a:t>
+              <a:t>9/17/25</a:t>
             </a:fld>
             <a:endParaRPr lang="en-US"/>
           </a:p>
@@ -1399,7 +1399,7 @@
           <a:p>
             <a:fld id="{367B2277-2DAA-45CC-87FF-D5D68B9BD360}" type="datetimeFigureOut">
               <a:rPr lang="en-US" smtClean="0"/>
-              <a:t>9/16/25</a:t>
+              <a:t>9/17/25</a:t>
             </a:fld>
             <a:endParaRPr lang="en-US"/>
           </a:p>
@@ -1825,7 +1825,7 @@
           <a:p>
             <a:fld id="{367B2277-2DAA-45CC-87FF-D5D68B9BD360}" type="datetimeFigureOut">
               <a:rPr lang="en-US" smtClean="0"/>
-              <a:t>9/16/25</a:t>
+              <a:t>9/17/25</a:t>
             </a:fld>
             <a:endParaRPr lang="en-US"/>
           </a:p>
@@ -2100,7 +2100,7 @@
           <a:p>
             <a:fld id="{367B2277-2DAA-45CC-87FF-D5D68B9BD360}" type="datetimeFigureOut">
               <a:rPr lang="en-US" smtClean="0"/>
-              <a:t>9/16/25</a:t>
+              <a:t>9/17/25</a:t>
             </a:fld>
             <a:endParaRPr lang="en-US"/>
           </a:p>
@@ -2365,7 +2365,7 @@
           <a:p>
             <a:fld id="{367B2277-2DAA-45CC-87FF-D5D68B9BD360}" type="datetimeFigureOut">
               <a:rPr lang="en-US" smtClean="0"/>
-              <a:t>9/16/25</a:t>
+              <a:t>9/17/25</a:t>
             </a:fld>
             <a:endParaRPr lang="en-US"/>
           </a:p>
@@ -2777,7 +2777,7 @@
           <a:p>
             <a:fld id="{367B2277-2DAA-45CC-87FF-D5D68B9BD360}" type="datetimeFigureOut">
               <a:rPr lang="en-US" smtClean="0"/>
-              <a:t>9/16/25</a:t>
+              <a:t>9/17/25</a:t>
             </a:fld>
             <a:endParaRPr lang="en-US"/>
           </a:p>
@@ -2918,7 +2918,7 @@
           <a:p>
             <a:fld id="{367B2277-2DAA-45CC-87FF-D5D68B9BD360}" type="datetimeFigureOut">
               <a:rPr lang="en-US" smtClean="0"/>
-              <a:t>9/16/25</a:t>
+              <a:t>9/17/25</a:t>
             </a:fld>
             <a:endParaRPr lang="en-US"/>
           </a:p>
@@ -3031,7 +3031,7 @@
           <a:p>
             <a:fld id="{367B2277-2DAA-45CC-87FF-D5D68B9BD360}" type="datetimeFigureOut">
               <a:rPr lang="en-US" smtClean="0"/>
-              <a:t>9/16/25</a:t>
+              <a:t>9/17/25</a:t>
             </a:fld>
             <a:endParaRPr lang="en-US"/>
           </a:p>
@@ -3342,7 +3342,7 @@
           <a:p>
             <a:fld id="{367B2277-2DAA-45CC-87FF-D5D68B9BD360}" type="datetimeFigureOut">
               <a:rPr lang="en-US" smtClean="0"/>
-              <a:t>9/16/25</a:t>
+              <a:t>9/17/25</a:t>
             </a:fld>
             <a:endParaRPr lang="en-US"/>
           </a:p>
@@ -3630,7 +3630,7 @@
           <a:p>
             <a:fld id="{367B2277-2DAA-45CC-87FF-D5D68B9BD360}" type="datetimeFigureOut">
               <a:rPr lang="en-US" smtClean="0"/>
-              <a:t>9/16/25</a:t>
+              <a:t>9/17/25</a:t>
             </a:fld>
             <a:endParaRPr lang="en-US"/>
           </a:p>
@@ -3871,7 +3871,7 @@
           <a:p>
             <a:fld id="{367B2277-2DAA-45CC-87FF-D5D68B9BD360}" type="datetimeFigureOut">
               <a:rPr lang="en-US" smtClean="0"/>
-              <a:t>9/16/25</a:t>
+              <a:t>9/17/25</a:t>
             </a:fld>
             <a:endParaRPr lang="en-US"/>
           </a:p>
@@ -4614,43 +4614,6 @@
       </p:cxnSp>
       <p:sp>
         <p:nvSpPr>
-          <p:cNvPr id="13" name="TextBox 12">
-            <a:extLst>
-              <a:ext uri="{FF2B5EF4-FFF2-40B4-BE49-F238E27FC236}">
-                <a16:creationId xmlns:a16="http://schemas.microsoft.com/office/drawing/2014/main" id="{B6B8A71D-231E-8FA0-2B88-7D963837B48E}"/>
-              </a:ext>
-            </a:extLst>
-          </p:cNvPr>
-          <p:cNvSpPr txBox="1"/>
-          <p:nvPr/>
-        </p:nvSpPr>
-        <p:spPr>
-          <a:xfrm>
-            <a:off x="291331" y="2432880"/>
-            <a:ext cx="2516138" cy="369332"/>
-          </a:xfrm>
-          <a:prstGeom prst="rect">
-            <a:avLst/>
-          </a:prstGeom>
-          <a:noFill/>
-        </p:spPr>
-        <p:txBody>
-          <a:bodyPr wrap="square">
-            <a:spAutoFit/>
-          </a:bodyPr>
-          <a:lstStyle/>
-          <a:p>
-            <a:endParaRPr lang="en-US">
-              <a:solidFill>
-                <a:schemeClr val="bg2"/>
-              </a:solidFill>
-              <a:latin typeface="Work Sans ExtraLight" pitchFamily="2" charset="0"/>
-            </a:endParaRPr>
-          </a:p>
-        </p:txBody>
-      </p:sp>
-      <p:sp>
-        <p:nvSpPr>
           <p:cNvPr id="14" name="TextBox 13">
             <a:extLst>
               <a:ext uri="{FF2B5EF4-FFF2-40B4-BE49-F238E27FC236}">
@@ -5000,7 +4963,7 @@
         </p:nvSpPr>
         <p:spPr>
           <a:xfrm>
-            <a:off x="2807469" y="2951319"/>
+            <a:off x="2807470" y="2641987"/>
             <a:ext cx="2169017" cy="707886"/>
           </a:xfrm>
           <a:prstGeom prst="rect">
@@ -5055,7 +5018,7 @@
         </p:nvSpPr>
         <p:spPr>
           <a:xfrm>
-            <a:off x="5625085" y="2951319"/>
+            <a:off x="5625086" y="2641987"/>
             <a:ext cx="2169017" cy="707886"/>
           </a:xfrm>
           <a:prstGeom prst="rect">
@@ -5110,7 +5073,7 @@
         </p:nvSpPr>
         <p:spPr>
           <a:xfrm>
-            <a:off x="7926157" y="2951319"/>
+            <a:off x="7926158" y="2641987"/>
             <a:ext cx="2169017" cy="707886"/>
           </a:xfrm>
           <a:prstGeom prst="rect">
@@ -5165,7 +5128,7 @@
         </p:nvCxnSpPr>
         <p:spPr>
           <a:xfrm>
-            <a:off x="2864892" y="3804051"/>
+            <a:off x="2864893" y="3494719"/>
             <a:ext cx="8597765" cy="0"/>
           </a:xfrm>
           <a:prstGeom prst="line">
@@ -5206,7 +5169,7 @@
         </p:nvSpPr>
         <p:spPr>
           <a:xfrm>
-            <a:off x="2807468" y="3918857"/>
+            <a:off x="2807469" y="3609525"/>
             <a:ext cx="2516139" cy="681597"/>
           </a:xfrm>
           <a:prstGeom prst="rect">
@@ -5270,7 +5233,7 @@
         </p:nvSpPr>
         <p:spPr>
           <a:xfrm>
-            <a:off x="5598126" y="3918857"/>
+            <a:off x="5598127" y="3609525"/>
             <a:ext cx="2328031" cy="707886"/>
           </a:xfrm>
           <a:prstGeom prst="rect">
@@ -5334,7 +5297,7 @@
         </p:nvSpPr>
         <p:spPr>
           <a:xfrm>
-            <a:off x="7941390" y="3911870"/>
+            <a:off x="7941391" y="3602538"/>
             <a:ext cx="2672726" cy="707886"/>
           </a:xfrm>
           <a:prstGeom prst="rect">
@@ -5398,8 +5361,8 @@
         </p:nvSpPr>
         <p:spPr>
           <a:xfrm>
-            <a:off x="9639022" y="380389"/>
-            <a:ext cx="2039978" cy="276999"/>
+            <a:off x="9513425" y="405007"/>
+            <a:ext cx="2415050" cy="276999"/>
           </a:xfrm>
           <a:prstGeom prst="rect">
             <a:avLst/>
@@ -5444,8 +5407,8 @@
         </p:nvSpPr>
         <p:spPr>
           <a:xfrm>
-            <a:off x="9639022" y="834026"/>
-            <a:ext cx="2039978" cy="276999"/>
+            <a:off x="9513425" y="875046"/>
+            <a:ext cx="2415050" cy="276998"/>
           </a:xfrm>
           <a:prstGeom prst="rect">
             <a:avLst/>
@@ -5490,8 +5453,8 @@
         </p:nvSpPr>
         <p:spPr>
           <a:xfrm>
-            <a:off x="9636987" y="1360164"/>
-            <a:ext cx="2016812" cy="276999"/>
+            <a:off x="9513425" y="1383823"/>
+            <a:ext cx="2415050" cy="276999"/>
           </a:xfrm>
           <a:prstGeom prst="rect">
             <a:avLst/>
@@ -5536,7 +5499,7 @@
         </p:nvSpPr>
         <p:spPr>
           <a:xfrm>
-            <a:off x="9389698" y="375204"/>
+            <a:off x="9264102" y="424107"/>
             <a:ext cx="498649" cy="276999"/>
           </a:xfrm>
           <a:prstGeom prst="rect">
@@ -5576,7 +5539,7 @@
         </p:nvSpPr>
         <p:spPr>
           <a:xfrm>
-            <a:off x="9389697" y="841638"/>
+            <a:off x="9264102" y="890757"/>
             <a:ext cx="498649" cy="276999"/>
           </a:xfrm>
           <a:prstGeom prst="rect">
@@ -5616,7 +5579,7 @@
         </p:nvSpPr>
         <p:spPr>
           <a:xfrm>
-            <a:off x="9407781" y="1388133"/>
+            <a:off x="9264101" y="1412780"/>
             <a:ext cx="498649" cy="276999"/>
           </a:xfrm>
           <a:prstGeom prst="rect">
@@ -6286,6 +6249,21 @@
 </file>
 
 <file path=customXml/item1.xml><?xml version="1.0" encoding="utf-8"?>
+<?mso-contentType ?>
+<FormTemplates xmlns="http://schemas.microsoft.com/sharepoint/v3/contenttype/forms">
+  <Display>DocumentLibraryForm</Display>
+  <Edit>DocumentLibraryForm</Edit>
+  <New>DocumentLibraryForm</New>
+</FormTemplates>
+</file>
+
+<file path=customXml/item2.xml><?xml version="1.0" encoding="utf-8"?>
+<p:properties xmlns:p="http://schemas.microsoft.com/office/2006/metadata/properties" xmlns:xsi="http://www.w3.org/2001/XMLSchema-instance" xmlns:pc="http://schemas.microsoft.com/office/infopath/2007/PartnerControls">
+  <documentManagement/>
+</p:properties>
+</file>
+
+<file path=customXml/item3.xml><?xml version="1.0" encoding="utf-8"?>
 <ct:contentTypeSchema xmlns:ct="http://schemas.microsoft.com/office/2006/metadata/contentType" xmlns:ma="http://schemas.microsoft.com/office/2006/metadata/properties/metaAttributes" ct:_="" ma:_="" ma:contentTypeName="Documento" ma:contentTypeID="0x0101006BC634EF743E7D4DAA2EF29C0AB2BD69" ma:contentTypeVersion="3" ma:contentTypeDescription="Creare un nuovo documento." ma:contentTypeScope="" ma:versionID="e645113b670e895dc8d49a18d43bbd74">
   <xsd:schema xmlns:xsd="http://www.w3.org/2001/XMLSchema" xmlns:xs="http://www.w3.org/2001/XMLSchema" xmlns:p="http://schemas.microsoft.com/office/2006/metadata/properties" xmlns:ns2="da8e8557-1d05-4873-8a45-7b5327c7b528" targetNamespace="http://schemas.microsoft.com/office/2006/metadata/properties" ma:root="true" ma:fieldsID="db653a39c7221fe238f49516383207bd" ns2:_="">
     <xsd:import namespace="da8e8557-1d05-4873-8a45-7b5327c7b528"/>
@@ -6423,35 +6401,10 @@
 </ct:contentTypeSchema>
 </file>
 
-<file path=customXml/item2.xml><?xml version="1.0" encoding="utf-8"?>
-<p:properties xmlns:p="http://schemas.microsoft.com/office/2006/metadata/properties" xmlns:xsi="http://www.w3.org/2001/XMLSchema-instance" xmlns:pc="http://schemas.microsoft.com/office/infopath/2007/PartnerControls">
-  <documentManagement/>
-</p:properties>
-</file>
-
-<file path=customXml/item3.xml><?xml version="1.0" encoding="utf-8"?>
-<?mso-contentType ?>
-<FormTemplates xmlns="http://schemas.microsoft.com/sharepoint/v3/contenttype/forms">
-  <Display>DocumentLibraryForm</Display>
-  <Edit>DocumentLibraryForm</Edit>
-  <New>DocumentLibraryForm</New>
-</FormTemplates>
-</file>
-
 <file path=customXml/itemProps1.xml><?xml version="1.0" encoding="utf-8"?>
-<ds:datastoreItem xmlns:ds="http://schemas.openxmlformats.org/officeDocument/2006/customXml" ds:itemID="{22E754EB-637B-408F-A6DF-93DF9DDF2402}">
+<ds:datastoreItem xmlns:ds="http://schemas.openxmlformats.org/officeDocument/2006/customXml" ds:itemID="{0DA1A951-CD38-45ED-97EB-4547FC46F585}">
   <ds:schemaRefs>
-    <ds:schemaRef ds:uri="da8e8557-1d05-4873-8a45-7b5327c7b528"/>
-    <ds:schemaRef ds:uri="http://purl.org/dc/elements/1.1/"/>
-    <ds:schemaRef ds:uri="http://purl.org/dc/terms/"/>
-    <ds:schemaRef ds:uri="http://schemas.microsoft.com/internal/obd"/>
-    <ds:schemaRef ds:uri="http://schemas.microsoft.com/office/2006/documentManagement/types"/>
-    <ds:schemaRef ds:uri="http://schemas.microsoft.com/office/2006/metadata/contentType"/>
-    <ds:schemaRef ds:uri="http://schemas.microsoft.com/office/2006/metadata/properties"/>
-    <ds:schemaRef ds:uri="http://schemas.microsoft.com/office/2006/metadata/properties/metaAttributes"/>
-    <ds:schemaRef ds:uri="http://schemas.microsoft.com/office/infopath/2007/PartnerControls"/>
-    <ds:schemaRef ds:uri="http://schemas.openxmlformats.org/package/2006/metadata/core-properties"/>
-    <ds:schemaRef ds:uri="http://www.w3.org/2001/XMLSchema"/>
+    <ds:schemaRef ds:uri="http://schemas.microsoft.com/sharepoint/v3/contenttype/forms"/>
   </ds:schemaRefs>
 </ds:datastoreItem>
 </file>
@@ -6473,9 +6426,19 @@
 </file>
 
 <file path=customXml/itemProps3.xml><?xml version="1.0" encoding="utf-8"?>
-<ds:datastoreItem xmlns:ds="http://schemas.openxmlformats.org/officeDocument/2006/customXml" ds:itemID="{0DA1A951-CD38-45ED-97EB-4547FC46F585}">
+<ds:datastoreItem xmlns:ds="http://schemas.openxmlformats.org/officeDocument/2006/customXml" ds:itemID="{22E754EB-637B-408F-A6DF-93DF9DDF2402}">
   <ds:schemaRefs>
-    <ds:schemaRef ds:uri="http://schemas.microsoft.com/sharepoint/v3/contenttype/forms"/>
+    <ds:schemaRef ds:uri="da8e8557-1d05-4873-8a45-7b5327c7b528"/>
+    <ds:schemaRef ds:uri="http://purl.org/dc/elements/1.1/"/>
+    <ds:schemaRef ds:uri="http://purl.org/dc/terms/"/>
+    <ds:schemaRef ds:uri="http://schemas.microsoft.com/internal/obd"/>
+    <ds:schemaRef ds:uri="http://schemas.microsoft.com/office/2006/documentManagement/types"/>
+    <ds:schemaRef ds:uri="http://schemas.microsoft.com/office/2006/metadata/contentType"/>
+    <ds:schemaRef ds:uri="http://schemas.microsoft.com/office/2006/metadata/properties"/>
+    <ds:schemaRef ds:uri="http://schemas.microsoft.com/office/2006/metadata/properties/metaAttributes"/>
+    <ds:schemaRef ds:uri="http://schemas.microsoft.com/office/infopath/2007/PartnerControls"/>
+    <ds:schemaRef ds:uri="http://schemas.openxmlformats.org/package/2006/metadata/core-properties"/>
+    <ds:schemaRef ds:uri="http://www.w3.org/2001/XMLSchema"/>
   </ds:schemaRefs>
 </ds:datastoreItem>
 </file>

</xml_diff>

<commit_message>
Feat: add KPI extraction logic + updated PPT template
</commit_message>
<xml_diff>
--- a/templates/BIP_MCG_Case Study_Insert Case Study Name.pptx
+++ b/templates/BIP_MCG_Case Study_Insert Case Study Name.pptx
@@ -5601,6 +5601,157 @@
                 <a:latin typeface=""/>
               </a:rPr>
               <a:t>#</a:t>
+            </a:r>
+          </a:p>
+        </p:txBody>
+      </p:sp>
+      <p:sp>
+        <p:nvSpPr>
+          <p:cNvPr id="13" name="TextBox 12">
+            <a:extLst>
+              <a:ext uri="{FF2B5EF4-FFF2-40B4-BE49-F238E27FC236}">
+                <a16:creationId xmlns:a16="http://schemas.microsoft.com/office/drawing/2014/main" id="{277B456F-0907-4278-A9D9-12DF39D4BE21}"/>
+              </a:ext>
+            </a:extLst>
+          </p:cNvPr>
+          <p:cNvSpPr txBox="1"/>
+          <p:nvPr/>
+        </p:nvSpPr>
+        <p:spPr>
+          <a:xfrm>
+            <a:off x="28880" y="598992"/>
+            <a:ext cx="2307595" cy="369332"/>
+          </a:xfrm>
+          <a:prstGeom prst="rect">
+            <a:avLst/>
+          </a:prstGeom>
+          <a:noFill/>
+        </p:spPr>
+        <p:txBody>
+          <a:bodyPr wrap="square">
+            <a:spAutoFit/>
+          </a:bodyPr>
+          <a:lstStyle/>
+          <a:p>
+            <a:pPr marL="0" marR="0" lvl="0" indent="0" algn="l" defTabSz="914400" rtl="0" eaLnBrk="1" fontAlgn="auto" latinLnBrk="0" hangingPunct="1">
+              <a:lnSpc>
+                <a:spcPct val="100000"/>
+              </a:lnSpc>
+              <a:spcBef>
+                <a:spcPts val="0"/>
+              </a:spcBef>
+              <a:spcAft>
+                <a:spcPts val="0"/>
+              </a:spcAft>
+              <a:buClrTx/>
+              <a:buSzTx/>
+              <a:buFontTx/>
+              <a:buNone/>
+              <a:tabLst/>
+              <a:defRPr/>
+            </a:pPr>
+            <a:r>
+              <a:rPr kumimoji="0" lang="en-US" sz="1800" b="0" i="0" u="none" strike="noStrike" kern="1200" cap="none" spc="0" normalizeH="0" baseline="0" noProof="0" dirty="0">
+                <a:ln>
+                  <a:noFill/>
+                </a:ln>
+                <a:solidFill>
+                  <a:srgbClr val="E7E6E6"/>
+                </a:solidFill>
+                <a:effectLst/>
+                <a:uLnTx/>
+                <a:uFillTx/>
+                <a:latin typeface="Work Sans ExtraLight" pitchFamily="2" charset="0"/>
+                <a:ea typeface="+mn-ea"/>
+                <a:cs typeface="+mn-cs"/>
+              </a:rPr>
+              <a:t>KPI1</a:t>
+            </a:r>
+          </a:p>
+        </p:txBody>
+      </p:sp>
+      <p:sp>
+        <p:nvSpPr>
+          <p:cNvPr id="22" name="TextBox 21">
+            <a:extLst>
+              <a:ext uri="{FF2B5EF4-FFF2-40B4-BE49-F238E27FC236}">
+                <a16:creationId xmlns:a16="http://schemas.microsoft.com/office/drawing/2014/main" id="{FFDACB99-91E9-4B22-64B3-E4DB21D0D79A}"/>
+              </a:ext>
+            </a:extLst>
+          </p:cNvPr>
+          <p:cNvSpPr txBox="1"/>
+          <p:nvPr/>
+        </p:nvSpPr>
+        <p:spPr>
+          <a:xfrm>
+            <a:off x="37979" y="2412520"/>
+            <a:ext cx="2289396" cy="369332"/>
+          </a:xfrm>
+          <a:prstGeom prst="rect">
+            <a:avLst/>
+          </a:prstGeom>
+          <a:noFill/>
+        </p:spPr>
+        <p:txBody>
+          <a:bodyPr wrap="square">
+            <a:spAutoFit/>
+          </a:bodyPr>
+          <a:lstStyle/>
+          <a:p>
+            <a:pPr lvl="0">
+              <a:defRPr/>
+            </a:pPr>
+            <a:r>
+              <a:rPr lang="en-US" dirty="0">
+                <a:solidFill>
+                  <a:srgbClr val="E7E6E6"/>
+                </a:solidFill>
+                <a:latin typeface="Work Sans ExtraLight" pitchFamily="2" charset="0"/>
+              </a:rPr>
+              <a:t>KPI2</a:t>
+            </a:r>
+          </a:p>
+        </p:txBody>
+      </p:sp>
+      <p:sp>
+        <p:nvSpPr>
+          <p:cNvPr id="25" name="TextBox 24">
+            <a:extLst>
+              <a:ext uri="{FF2B5EF4-FFF2-40B4-BE49-F238E27FC236}">
+                <a16:creationId xmlns:a16="http://schemas.microsoft.com/office/drawing/2014/main" id="{870AC1BC-5890-C077-8C87-56139ADCB4C2}"/>
+              </a:ext>
+            </a:extLst>
+          </p:cNvPr>
+          <p:cNvSpPr txBox="1"/>
+          <p:nvPr/>
+        </p:nvSpPr>
+        <p:spPr>
+          <a:xfrm>
+            <a:off x="75446" y="4349744"/>
+            <a:ext cx="2251929" cy="369332"/>
+          </a:xfrm>
+          <a:prstGeom prst="rect">
+            <a:avLst/>
+          </a:prstGeom>
+          <a:noFill/>
+        </p:spPr>
+        <p:txBody>
+          <a:bodyPr wrap="square">
+            <a:spAutoFit/>
+          </a:bodyPr>
+          <a:lstStyle/>
+          <a:p>
+            <a:pPr>
+              <a:defRPr/>
+            </a:pPr>
+            <a:r>
+              <a:rPr lang="en-US" dirty="0">
+                <a:solidFill>
+                  <a:srgbClr val="E7E6E6"/>
+                </a:solidFill>
+                <a:latin typeface="Work Sans ExtraLight" pitchFamily="2" charset="0"/>
+              </a:rPr>
+              <a:t>KPI3</a:t>
             </a:r>
           </a:p>
         </p:txBody>
@@ -6249,18 +6400,18 @@
 </file>
 
 <file path=customXml/item1.xml><?xml version="1.0" encoding="utf-8"?>
+<p:properties xmlns:p="http://schemas.microsoft.com/office/2006/metadata/properties" xmlns:xsi="http://www.w3.org/2001/XMLSchema-instance" xmlns:pc="http://schemas.microsoft.com/office/infopath/2007/PartnerControls">
+  <documentManagement/>
+</p:properties>
+</file>
+
+<file path=customXml/item2.xml><?xml version="1.0" encoding="utf-8"?>
 <?mso-contentType ?>
 <FormTemplates xmlns="http://schemas.microsoft.com/sharepoint/v3/contenttype/forms">
   <Display>DocumentLibraryForm</Display>
   <Edit>DocumentLibraryForm</Edit>
   <New>DocumentLibraryForm</New>
 </FormTemplates>
-</file>
-
-<file path=customXml/item2.xml><?xml version="1.0" encoding="utf-8"?>
-<p:properties xmlns:p="http://schemas.microsoft.com/office/2006/metadata/properties" xmlns:xsi="http://www.w3.org/2001/XMLSchema-instance" xmlns:pc="http://schemas.microsoft.com/office/infopath/2007/PartnerControls">
-  <documentManagement/>
-</p:properties>
 </file>
 
 <file path=customXml/item3.xml><?xml version="1.0" encoding="utf-8"?>
@@ -6402,14 +6553,6 @@
 </file>
 
 <file path=customXml/itemProps1.xml><?xml version="1.0" encoding="utf-8"?>
-<ds:datastoreItem xmlns:ds="http://schemas.openxmlformats.org/officeDocument/2006/customXml" ds:itemID="{0DA1A951-CD38-45ED-97EB-4547FC46F585}">
-  <ds:schemaRefs>
-    <ds:schemaRef ds:uri="http://schemas.microsoft.com/sharepoint/v3/contenttype/forms"/>
-  </ds:schemaRefs>
-</ds:datastoreItem>
-</file>
-
-<file path=customXml/itemProps2.xml><?xml version="1.0" encoding="utf-8"?>
 <ds:datastoreItem xmlns:ds="http://schemas.openxmlformats.org/officeDocument/2006/customXml" ds:itemID="{1D527B0C-6515-499D-A58D-916DE982A8D2}">
   <ds:schemaRefs>
     <ds:schemaRef ds:uri="http://purl.org/dc/elements/1.1/"/>
@@ -6421,6 +6564,14 @@
     <ds:schemaRef ds:uri="http://purl.org/dc/terms/"/>
     <ds:schemaRef ds:uri="da8e8557-1d05-4873-8a45-7b5327c7b528"/>
     <ds:schemaRef ds:uri="http://purl.org/dc/dcmitype/"/>
+  </ds:schemaRefs>
+</ds:datastoreItem>
+</file>
+
+<file path=customXml/itemProps2.xml><?xml version="1.0" encoding="utf-8"?>
+<ds:datastoreItem xmlns:ds="http://schemas.openxmlformats.org/officeDocument/2006/customXml" ds:itemID="{0DA1A951-CD38-45ED-97EB-4547FC46F585}">
+  <ds:schemaRefs>
+    <ds:schemaRef ds:uri="http://schemas.microsoft.com/sharepoint/v3/contenttype/forms"/>
   </ds:schemaRefs>
 </ds:datastoreItem>
 </file>

</xml_diff>

<commit_message>
Update: refreshed PPT template for case study automation
</commit_message>
<xml_diff>
--- a/templates/BIP_MCG_Case Study_Insert Case Study Name.pptx
+++ b/templates/BIP_MCG_Case Study_Insert Case Study Name.pptx
@@ -5619,8 +5619,8 @@
         </p:nvSpPr>
         <p:spPr>
           <a:xfrm>
-            <a:off x="28880" y="598992"/>
-            <a:ext cx="2307595" cy="369332"/>
+            <a:off x="146455" y="608349"/>
+            <a:ext cx="2180920" cy="369332"/>
           </a:xfrm>
           <a:prstGeom prst="rect">
             <a:avLst/>
@@ -5672,10 +5672,10 @@
       </p:sp>
       <p:sp>
         <p:nvSpPr>
-          <p:cNvPr id="22" name="TextBox 21">
-            <a:extLst>
-              <a:ext uri="{FF2B5EF4-FFF2-40B4-BE49-F238E27FC236}">
-                <a16:creationId xmlns:a16="http://schemas.microsoft.com/office/drawing/2014/main" id="{FFDACB99-91E9-4B22-64B3-E4DB21D0D79A}"/>
+          <p:cNvPr id="32" name="TextBox 31">
+            <a:extLst>
+              <a:ext uri="{FF2B5EF4-FFF2-40B4-BE49-F238E27FC236}">
+                <a16:creationId xmlns:a16="http://schemas.microsoft.com/office/drawing/2014/main" id="{EE29085B-8C2E-BF18-F672-4DC048595D06}"/>
               </a:ext>
             </a:extLst>
           </p:cNvPr>
@@ -5684,8 +5684,8 @@
         </p:nvSpPr>
         <p:spPr>
           <a:xfrm>
-            <a:off x="37979" y="2412520"/>
-            <a:ext cx="2289396" cy="369332"/>
+            <a:off x="155556" y="2641987"/>
+            <a:ext cx="2180920" cy="369332"/>
           </a:xfrm>
           <a:prstGeom prst="rect">
             <a:avLst/>
@@ -5698,15 +5698,37 @@
           </a:bodyPr>
           <a:lstStyle/>
           <a:p>
-            <a:pPr lvl="0">
+            <a:pPr marL="0" marR="0" lvl="0" indent="0" algn="l" defTabSz="914400" rtl="0" eaLnBrk="1" fontAlgn="auto" latinLnBrk="0" hangingPunct="1">
+              <a:lnSpc>
+                <a:spcPct val="100000"/>
+              </a:lnSpc>
+              <a:spcBef>
+                <a:spcPts val="0"/>
+              </a:spcBef>
+              <a:spcAft>
+                <a:spcPts val="0"/>
+              </a:spcAft>
+              <a:buClrTx/>
+              <a:buSzTx/>
+              <a:buFontTx/>
+              <a:buNone/>
+              <a:tabLst/>
               <a:defRPr/>
             </a:pPr>
             <a:r>
-              <a:rPr lang="en-US" dirty="0">
+              <a:rPr kumimoji="0" lang="en-US" sz="1800" b="0" i="0" u="none" strike="noStrike" kern="1200" cap="none" spc="0" normalizeH="0" baseline="0" noProof="0" dirty="0">
+                <a:ln>
+                  <a:noFill/>
+                </a:ln>
                 <a:solidFill>
                   <a:srgbClr val="E7E6E6"/>
                 </a:solidFill>
+                <a:effectLst/>
+                <a:uLnTx/>
+                <a:uFillTx/>
                 <a:latin typeface="Work Sans ExtraLight" pitchFamily="2" charset="0"/>
+                <a:ea typeface="+mn-ea"/>
+                <a:cs typeface="+mn-cs"/>
               </a:rPr>
               <a:t>KPI2</a:t>
             </a:r>
@@ -5715,10 +5737,10 @@
       </p:sp>
       <p:sp>
         <p:nvSpPr>
-          <p:cNvPr id="25" name="TextBox 24">
-            <a:extLst>
-              <a:ext uri="{FF2B5EF4-FFF2-40B4-BE49-F238E27FC236}">
-                <a16:creationId xmlns:a16="http://schemas.microsoft.com/office/drawing/2014/main" id="{870AC1BC-5890-C077-8C87-56139ADCB4C2}"/>
+          <p:cNvPr id="33" name="TextBox 32">
+            <a:extLst>
+              <a:ext uri="{FF2B5EF4-FFF2-40B4-BE49-F238E27FC236}">
+                <a16:creationId xmlns:a16="http://schemas.microsoft.com/office/drawing/2014/main" id="{D85C8B59-5707-B4A1-3FB4-F6BDB2337C71}"/>
               </a:ext>
             </a:extLst>
           </p:cNvPr>
@@ -5727,8 +5749,8 @@
         </p:nvSpPr>
         <p:spPr>
           <a:xfrm>
-            <a:off x="75446" y="4349744"/>
-            <a:ext cx="2251929" cy="369332"/>
+            <a:off x="155556" y="4650199"/>
+            <a:ext cx="2180920" cy="369332"/>
           </a:xfrm>
           <a:prstGeom prst="rect">
             <a:avLst/>
@@ -5741,15 +5763,37 @@
           </a:bodyPr>
           <a:lstStyle/>
           <a:p>
-            <a:pPr>
+            <a:pPr marL="0" marR="0" lvl="0" indent="0" algn="l" defTabSz="914400" rtl="0" eaLnBrk="1" fontAlgn="auto" latinLnBrk="0" hangingPunct="1">
+              <a:lnSpc>
+                <a:spcPct val="100000"/>
+              </a:lnSpc>
+              <a:spcBef>
+                <a:spcPts val="0"/>
+              </a:spcBef>
+              <a:spcAft>
+                <a:spcPts val="0"/>
+              </a:spcAft>
+              <a:buClrTx/>
+              <a:buSzTx/>
+              <a:buFontTx/>
+              <a:buNone/>
+              <a:tabLst/>
               <a:defRPr/>
             </a:pPr>
             <a:r>
-              <a:rPr lang="en-US" dirty="0">
+              <a:rPr kumimoji="0" lang="en-US" sz="1800" b="0" i="0" u="none" strike="noStrike" kern="1200" cap="none" spc="0" normalizeH="0" baseline="0" noProof="0" dirty="0">
+                <a:ln>
+                  <a:noFill/>
+                </a:ln>
                 <a:solidFill>
                   <a:srgbClr val="E7E6E6"/>
                 </a:solidFill>
+                <a:effectLst/>
+                <a:uLnTx/>
+                <a:uFillTx/>
                 <a:latin typeface="Work Sans ExtraLight" pitchFamily="2" charset="0"/>
+                <a:ea typeface="+mn-ea"/>
+                <a:cs typeface="+mn-cs"/>
               </a:rPr>
               <a:t>KPI3</a:t>
             </a:r>
@@ -6400,21 +6444,6 @@
 </file>
 
 <file path=customXml/item1.xml><?xml version="1.0" encoding="utf-8"?>
-<p:properties xmlns:p="http://schemas.microsoft.com/office/2006/metadata/properties" xmlns:xsi="http://www.w3.org/2001/XMLSchema-instance" xmlns:pc="http://schemas.microsoft.com/office/infopath/2007/PartnerControls">
-  <documentManagement/>
-</p:properties>
-</file>
-
-<file path=customXml/item2.xml><?xml version="1.0" encoding="utf-8"?>
-<?mso-contentType ?>
-<FormTemplates xmlns="http://schemas.microsoft.com/sharepoint/v3/contenttype/forms">
-  <Display>DocumentLibraryForm</Display>
-  <Edit>DocumentLibraryForm</Edit>
-  <New>DocumentLibraryForm</New>
-</FormTemplates>
-</file>
-
-<file path=customXml/item3.xml><?xml version="1.0" encoding="utf-8"?>
 <ct:contentTypeSchema xmlns:ct="http://schemas.microsoft.com/office/2006/metadata/contentType" xmlns:ma="http://schemas.microsoft.com/office/2006/metadata/properties/metaAttributes" ct:_="" ma:_="" ma:contentTypeName="Documento" ma:contentTypeID="0x0101006BC634EF743E7D4DAA2EF29C0AB2BD69" ma:contentTypeVersion="3" ma:contentTypeDescription="Creare un nuovo documento." ma:contentTypeScope="" ma:versionID="e645113b670e895dc8d49a18d43bbd74">
   <xsd:schema xmlns:xsd="http://www.w3.org/2001/XMLSchema" xmlns:xs="http://www.w3.org/2001/XMLSchema" xmlns:p="http://schemas.microsoft.com/office/2006/metadata/properties" xmlns:ns2="da8e8557-1d05-4873-8a45-7b5327c7b528" targetNamespace="http://schemas.microsoft.com/office/2006/metadata/properties" ma:root="true" ma:fieldsID="db653a39c7221fe238f49516383207bd" ns2:_="">
     <xsd:import namespace="da8e8557-1d05-4873-8a45-7b5327c7b528"/>
@@ -6552,31 +6581,22 @@
 </ct:contentTypeSchema>
 </file>
 
-<file path=customXml/itemProps1.xml><?xml version="1.0" encoding="utf-8"?>
-<ds:datastoreItem xmlns:ds="http://schemas.openxmlformats.org/officeDocument/2006/customXml" ds:itemID="{1D527B0C-6515-499D-A58D-916DE982A8D2}">
-  <ds:schemaRefs>
-    <ds:schemaRef ds:uri="http://purl.org/dc/elements/1.1/"/>
-    <ds:schemaRef ds:uri="http://schemas.microsoft.com/office/infopath/2007/PartnerControls"/>
-    <ds:schemaRef ds:uri="http://schemas.openxmlformats.org/package/2006/metadata/core-properties"/>
-    <ds:schemaRef ds:uri="http://www.w3.org/XML/1998/namespace"/>
-    <ds:schemaRef ds:uri="http://schemas.microsoft.com/office/2006/documentManagement/types"/>
-    <ds:schemaRef ds:uri="http://schemas.microsoft.com/office/2006/metadata/properties"/>
-    <ds:schemaRef ds:uri="http://purl.org/dc/terms/"/>
-    <ds:schemaRef ds:uri="da8e8557-1d05-4873-8a45-7b5327c7b528"/>
-    <ds:schemaRef ds:uri="http://purl.org/dc/dcmitype/"/>
-  </ds:schemaRefs>
-</ds:datastoreItem>
+<file path=customXml/item2.xml><?xml version="1.0" encoding="utf-8"?>
+<?mso-contentType ?>
+<FormTemplates xmlns="http://schemas.microsoft.com/sharepoint/v3/contenttype/forms">
+  <Display>DocumentLibraryForm</Display>
+  <Edit>DocumentLibraryForm</Edit>
+  <New>DocumentLibraryForm</New>
+</FormTemplates>
 </file>
 
-<file path=customXml/itemProps2.xml><?xml version="1.0" encoding="utf-8"?>
-<ds:datastoreItem xmlns:ds="http://schemas.openxmlformats.org/officeDocument/2006/customXml" ds:itemID="{0DA1A951-CD38-45ED-97EB-4547FC46F585}">
-  <ds:schemaRefs>
-    <ds:schemaRef ds:uri="http://schemas.microsoft.com/sharepoint/v3/contenttype/forms"/>
-  </ds:schemaRefs>
-</ds:datastoreItem>
+<file path=customXml/item3.xml><?xml version="1.0" encoding="utf-8"?>
+<p:properties xmlns:p="http://schemas.microsoft.com/office/2006/metadata/properties" xmlns:xsi="http://www.w3.org/2001/XMLSchema-instance" xmlns:pc="http://schemas.microsoft.com/office/infopath/2007/PartnerControls">
+  <documentManagement/>
+</p:properties>
 </file>
 
-<file path=customXml/itemProps3.xml><?xml version="1.0" encoding="utf-8"?>
+<file path=customXml/itemProps1.xml><?xml version="1.0" encoding="utf-8"?>
 <ds:datastoreItem xmlns:ds="http://schemas.openxmlformats.org/officeDocument/2006/customXml" ds:itemID="{22E754EB-637B-408F-A6DF-93DF9DDF2402}">
   <ds:schemaRefs>
     <ds:schemaRef ds:uri="da8e8557-1d05-4873-8a45-7b5327c7b528"/>
@@ -6594,6 +6614,30 @@
 </ds:datastoreItem>
 </file>
 
+<file path=customXml/itemProps2.xml><?xml version="1.0" encoding="utf-8"?>
+<ds:datastoreItem xmlns:ds="http://schemas.openxmlformats.org/officeDocument/2006/customXml" ds:itemID="{0DA1A951-CD38-45ED-97EB-4547FC46F585}">
+  <ds:schemaRefs>
+    <ds:schemaRef ds:uri="http://schemas.microsoft.com/sharepoint/v3/contenttype/forms"/>
+  </ds:schemaRefs>
+</ds:datastoreItem>
+</file>
+
+<file path=customXml/itemProps3.xml><?xml version="1.0" encoding="utf-8"?>
+<ds:datastoreItem xmlns:ds="http://schemas.openxmlformats.org/officeDocument/2006/customXml" ds:itemID="{1D527B0C-6515-499D-A58D-916DE982A8D2}">
+  <ds:schemaRefs>
+    <ds:schemaRef ds:uri="http://purl.org/dc/elements/1.1/"/>
+    <ds:schemaRef ds:uri="http://schemas.microsoft.com/office/infopath/2007/PartnerControls"/>
+    <ds:schemaRef ds:uri="http://schemas.openxmlformats.org/package/2006/metadata/core-properties"/>
+    <ds:schemaRef ds:uri="http://www.w3.org/XML/1998/namespace"/>
+    <ds:schemaRef ds:uri="http://schemas.microsoft.com/office/2006/documentManagement/types"/>
+    <ds:schemaRef ds:uri="http://schemas.microsoft.com/office/2006/metadata/properties"/>
+    <ds:schemaRef ds:uri="http://purl.org/dc/terms/"/>
+    <ds:schemaRef ds:uri="da8e8557-1d05-4873-8a45-7b5327c7b528"/>
+    <ds:schemaRef ds:uri="http://purl.org/dc/dcmitype/"/>
+  </ds:schemaRefs>
+</ds:datastoreItem>
+</file>
+
 <file path=docMetadata/LabelInfo.xml><?xml version="1.0" encoding="utf-8"?>
 <clbl:labelList xmlns:clbl="http://schemas.microsoft.com/office/2020/mipLabelMetadata">
   <clbl:label id="{bb1a63eb-eb09-471a-a005-37b07792a5b5}" enabled="0" method="" siteId="{bb1a63eb-eb09-471a-a005-37b07792a5b5}" removed="1"/>

</xml_diff>